<commit_message>
a long long day
</commit_message>
<xml_diff>
--- a/开题/硕士开题报告_庞人铭.pptx
+++ b/开题/硕士开题报告_庞人铭.pptx
@@ -2664,7 +2664,15 @@
           <a:p>
             <a:r>
               <a:rPr lang="zh-CN" altLang="en-US" dirty="0" smtClean="0"/>
-              <a:t>我国钢铁产量大，高炉炼铁在其中的能耗和生产成本占比很大</a:t>
+              <a:t>我国钢铁产量大，高炉炼铁</a:t>
+            </a:r>
+            <a:r>
+              <a:rPr lang="zh-CN" altLang="en-US" dirty="0" smtClean="0"/>
+              <a:t>在钢铁工业体系中</a:t>
+            </a:r>
+            <a:r>
+              <a:rPr lang="zh-CN" altLang="en-US" dirty="0" smtClean="0"/>
+              <a:t>的能耗和生产成本占比很大</a:t>
             </a:r>
             <a:endParaRPr lang="en-US" altLang="zh-CN" dirty="0" smtClean="0"/>
           </a:p>
@@ -2800,15 +2808,15 @@
           <a:p>
             <a:r>
               <a:rPr lang="zh-CN" altLang="en-US" dirty="0" smtClean="0"/>
-              <a:t>高炉冶炼工艺</a:t>
+              <a:t>高炉冶炼工艺如图所示，高炉是一种逆流式圆筒型反应容器。首先将一定配比的铁矿石、焦炭等原料从炉喉装入高炉，热风炉从高炉底部鼓入热风以及一定的煤粉和富氧，形成大量高温煤气，</a:t>
             </a:r>
             <a:r>
               <a:rPr lang="zh-CN" altLang="en-US" dirty="0" smtClean="0"/>
-              <a:t>如图所</a:t>
+              <a:t>在高炉的高温</a:t>
             </a:r>
             <a:r>
               <a:rPr lang="zh-CN" altLang="en-US" dirty="0" smtClean="0"/>
-              <a:t>示，高炉是一种逆流式圆筒型反应容器。首先将一定配比的铁矿石、焦炭等原料从炉喉装入高炉，热风炉从高炉底部鼓入热风以及一定的煤粉和富氧，形成大量高温煤气，在高温高压下与下降的铁矿原料发生还原反应，生成的铁水会定期从炉缸中排出，剩下的炉渣从渣口排放，煤气从炉顶导出。</a:t>
+              <a:t>高压下与下降的铁矿原料发生还原反应，生成的铁水会定期从炉缸中排出，剩下的炉渣从渣口排放，煤气从炉顶导出。</a:t>
             </a:r>
             <a:endParaRPr lang="zh-CN" altLang="en-US" dirty="0"/>
           </a:p>
@@ -2926,7 +2934,7 @@
                 <a:ea typeface="+mn-ea"/>
                 <a:cs typeface="+mn-cs"/>
               </a:rPr>
-              <a:t>在高炉的具体冶炼过程中，物料</a:t>
+              <a:t>在高炉的具体冶炼过程中</a:t>
             </a:r>
             <a:r>
               <a:rPr lang="zh-CN" altLang="en-US" sz="1200" kern="1200" dirty="0" smtClean="0">
@@ -2938,7 +2946,7 @@
                 <a:ea typeface="+mn-ea"/>
                 <a:cs typeface="+mn-cs"/>
               </a:rPr>
-              <a:t>自顶向下可以细分</a:t>
+              <a:t>，根据物料的物理状态可以分为</a:t>
             </a:r>
             <a:r>
               <a:rPr lang="zh-CN" altLang="en-US" sz="1200" kern="1200" dirty="0" smtClean="0">
@@ -2950,19 +2958,7 @@
                 <a:ea typeface="+mn-ea"/>
                 <a:cs typeface="+mn-cs"/>
               </a:rPr>
-              <a:t>为块状带、软融带、滴落带、风口回旋区、渣铁收集区</a:t>
-            </a:r>
-            <a:r>
-              <a:rPr lang="zh-CN" altLang="en-US" sz="1200" kern="1200" dirty="0" smtClean="0">
-                <a:solidFill>
-                  <a:schemeClr val="tx1"/>
-                </a:solidFill>
-                <a:effectLst/>
-                <a:latin typeface="+mn-lt"/>
-                <a:ea typeface="+mn-ea"/>
-                <a:cs typeface="+mn-cs"/>
-              </a:rPr>
-              <a:t>。</a:t>
+              <a:t>块状带、软融带、滴落带、风口回旋区、渣铁收集区。</a:t>
             </a:r>
             <a:endParaRPr lang="en-US" altLang="zh-CN" sz="1200" kern="1200" dirty="0" smtClean="0">
               <a:solidFill>
@@ -3002,31 +2998,7 @@
                 <a:ea typeface="+mn-ea"/>
                 <a:cs typeface="+mn-cs"/>
               </a:rPr>
-              <a:t>平稳</a:t>
-            </a:r>
-            <a:r>
-              <a:rPr lang="zh-CN" altLang="en-US" sz="1200" kern="1200" dirty="0" smtClean="0">
-                <a:solidFill>
-                  <a:schemeClr val="tx1"/>
-                </a:solidFill>
-                <a:effectLst/>
-                <a:latin typeface="+mn-lt"/>
-                <a:ea typeface="+mn-ea"/>
-                <a:cs typeface="+mn-cs"/>
-              </a:rPr>
-              <a:t>合理的状态区域分布有利于高炉炉况的稳定和生产安全</a:t>
-            </a:r>
-            <a:r>
-              <a:rPr lang="zh-CN" altLang="en-US" sz="1200" kern="1200" dirty="0" smtClean="0">
-                <a:solidFill>
-                  <a:schemeClr val="tx1"/>
-                </a:solidFill>
-                <a:effectLst/>
-                <a:latin typeface="+mn-lt"/>
-                <a:ea typeface="+mn-ea"/>
-                <a:cs typeface="+mn-cs"/>
-              </a:rPr>
-              <a:t>。</a:t>
+              <a:t>平稳合理的状态区域分布有利于高炉炉况的稳定和生产安全。</a:t>
             </a:r>
           </a:p>
           <a:p>
@@ -3195,19 +3167,7 @@
                 <a:ea typeface="+mn-ea"/>
                 <a:cs typeface="+mn-cs"/>
               </a:rPr>
-              <a:t>悬料</a:t>
-            </a:r>
-            <a:r>
-              <a:rPr lang="zh-CN" altLang="zh-CN" sz="1200" kern="1200" dirty="0" smtClean="0">
-                <a:solidFill>
-                  <a:schemeClr val="tx1"/>
-                </a:solidFill>
-                <a:effectLst/>
-                <a:latin typeface="+mn-lt"/>
-                <a:ea typeface="+mn-ea"/>
-                <a:cs typeface="+mn-cs"/>
-              </a:rPr>
-              <a:t>：当高炉内部温度过高时，炉体的透气性变差，处于下降状态的炉料和处于上升状态的边沿气流都在运动过程中发生了停滞，引起炉内风压的急剧上升，造成了一种看似是悬空的状态。</a:t>
+              <a:t>悬料：当高炉内部温度过高时，炉体的透气性变差，处于下降状态的炉料和处于上升状态的边沿气流都在运动过程中发生了停滞，引起炉内风压的急剧上升，造成了一种看似是悬空的状态。</a:t>
             </a:r>
           </a:p>
           <a:p>
@@ -14495,16 +14455,28 @@
           <a:p>
             <a:r>
               <a:rPr lang="zh-CN" altLang="en-US" sz="2800" dirty="0" smtClean="0"/>
-              <a:t>类似</a:t>
+              <a:t>类似语音识别</a:t>
             </a:r>
             <a:r>
               <a:rPr lang="zh-CN" altLang="en-US" sz="2800" dirty="0" smtClean="0"/>
-              <a:t>语音识别，</a:t>
+              <a:t>，构建</a:t>
             </a:r>
             <a:r>
               <a:rPr lang="en-US" altLang="zh-CN" sz="2800" dirty="0" smtClean="0"/>
               <a:t>end-to-end</a:t>
             </a:r>
+            <a:r>
+              <a:rPr lang="zh-CN" altLang="en-US" sz="2800" dirty="0" smtClean="0"/>
+              <a:t>的</a:t>
+            </a:r>
+            <a:r>
+              <a:rPr lang="en-US" altLang="zh-CN" sz="2800" dirty="0" smtClean="0"/>
+              <a:t>LSTM</a:t>
+            </a:r>
+            <a:r>
+              <a:rPr lang="zh-CN" altLang="en-US" sz="2800" dirty="0" smtClean="0"/>
+              <a:t>网络</a:t>
+            </a:r>
             <a:endParaRPr lang="zh-CN" altLang="en-US" sz="2800" dirty="0"/>
           </a:p>
           <a:p>
@@ -14514,11 +14486,7 @@
             </a:r>
             <a:r>
               <a:rPr lang="en-US" altLang="zh-CN" sz="2800" dirty="0" smtClean="0"/>
-              <a:t>X(t</a:t>
-            </a:r>
-            <a:r>
-              <a:rPr lang="en-US" altLang="zh-CN" sz="2800" dirty="0" smtClean="0"/>
-              <a:t>)</a:t>
+              <a:t>X(t)</a:t>
             </a:r>
             <a:r>
               <a:rPr lang="en-US" altLang="zh-CN" sz="2800" dirty="0"/>
@@ -14872,7 +14840,7 @@
         </p:nvSpPr>
         <p:spPr>
           <a:xfrm>
-            <a:off x="2557463" y="2185988"/>
+            <a:off x="2844066" y="2895671"/>
             <a:ext cx="4281487" cy="1323439"/>
           </a:xfrm>
           <a:prstGeom prst="rect">
@@ -15551,7 +15519,11 @@
           <a:p>
             <a:r>
               <a:rPr lang="zh-CN" altLang="en-US" sz="2800" dirty="0" smtClean="0"/>
-              <a:t>普遍采用专家系统</a:t>
+              <a:t>实际应用中普遍</a:t>
+            </a:r>
+            <a:r>
+              <a:rPr lang="zh-CN" altLang="en-US" sz="2800" dirty="0" smtClean="0"/>
+              <a:t>采用专家系统</a:t>
             </a:r>
             <a:endParaRPr lang="en-US" altLang="zh-CN" sz="2800" dirty="0" smtClean="0"/>
           </a:p>

</xml_diff>